<commit_message>
percorso con velocità e plot delle performance
</commit_message>
<xml_diff>
--- a/slides/presentazione 21-05-19.pptx
+++ b/slides/presentazione 21-05-19.pptx
@@ -580,7 +580,7 @@
               <a:t>1 </a:t>
             </a:r>
             <a:r>
-              <a:rPr lang="it-IT" dirty="0" err="1"/>
+              <a:rPr lang="en-US" noProof="0" dirty="0"/>
               <a:t>kn</a:t>
             </a:r>
             <a:r>
@@ -746,15 +746,7 @@
             </a:pPr>
             <a:r>
               <a:rPr lang="it-IT" dirty="0"/>
-              <a:t>1 </a:t>
-            </a:r>
-            <a:r>
-              <a:rPr lang="it-IT" dirty="0" err="1"/>
-              <a:t>kn</a:t>
-            </a:r>
-            <a:r>
-              <a:rPr lang="it-IT" dirty="0"/>
-              <a:t> = </a:t>
+              <a:t>1 kn = </a:t>
             </a:r>
             <a:r>
               <a:rPr lang="en-US" sz="1200" b="0" i="0" kern="1200" dirty="0">
@@ -5390,8 +5382,8 @@
           </a:p>
         </p:txBody>
       </p:sp>
-      <mc:AlternateContent xmlns:mc="http://schemas.openxmlformats.org/markup-compatibility/2006" xmlns:a14="http://schemas.microsoft.com/office/drawing/2010/main">
-        <mc:Choice Requires="a14">
+      <mc:AlternateContent xmlns:mc="http://schemas.openxmlformats.org/markup-compatibility/2006">
+        <mc:Choice xmlns:a14="http://schemas.microsoft.com/office/drawing/2010/main" Requires="a14">
           <p:sp>
             <p:nvSpPr>
               <p:cNvPr id="11" name="CasellaDiTesto 10"/>
@@ -5419,7 +5411,7 @@
                   <a:buChar char="•"/>
                 </a:pPr>
                 <a:r>
-                  <a:rPr lang="it-IT" dirty="0" err="1">
+                  <a:rPr lang="en-US" dirty="0">
                     <a:latin typeface="Gill Sans Light"/>
                     <a:cs typeface="Gill Sans Light"/>
                   </a:rPr>
@@ -5732,7 +5724,7 @@
             </p:txBody>
           </p:sp>
         </mc:Choice>
-        <mc:Fallback xmlns="">
+        <mc:Fallback>
           <p:sp>
             <p:nvSpPr>
               <p:cNvPr id="11" name="CasellaDiTesto 10"/>
@@ -15709,8 +15701,8 @@
           </a:p>
         </p:txBody>
       </p:sp>
-      <mc:AlternateContent xmlns:mc="http://schemas.openxmlformats.org/markup-compatibility/2006">
-        <mc:Choice xmlns:a14="http://schemas.microsoft.com/office/drawing/2010/main" Requires="a14">
+      <mc:AlternateContent xmlns:mc="http://schemas.openxmlformats.org/markup-compatibility/2006" xmlns:a14="http://schemas.microsoft.com/office/drawing/2010/main">
+        <mc:Choice Requires="a14">
           <p:graphicFrame>
             <p:nvGraphicFramePr>
               <p:cNvPr id="9" name="Tabella 8">
@@ -16435,7 +16427,7 @@
             </a:graphic>
           </p:graphicFrame>
         </mc:Choice>
-        <mc:Fallback>
+        <mc:Fallback xmlns="">
           <p:graphicFrame>
             <p:nvGraphicFramePr>
               <p:cNvPr id="9" name="Tabella 8">
@@ -22370,8 +22362,8 @@
           </p:sp>
         </mc:Fallback>
       </mc:AlternateContent>
-      <mc:AlternateContent xmlns:mc="http://schemas.openxmlformats.org/markup-compatibility/2006">
-        <mc:Choice xmlns:a14="http://schemas.microsoft.com/office/drawing/2010/main" Requires="a14">
+      <mc:AlternateContent xmlns:mc="http://schemas.openxmlformats.org/markup-compatibility/2006" xmlns:a14="http://schemas.microsoft.com/office/drawing/2010/main">
+        <mc:Choice Requires="a14">
           <p:sp>
             <p:nvSpPr>
               <p:cNvPr id="14" name="CasellaDiTesto 13">
@@ -22503,13 +22495,7 @@
                       <a:rPr lang="it-IT" b="0" i="1" smtClean="0">
                         <a:latin typeface="Cambria Math" panose="02040503050406030204" pitchFamily="18" charset="0"/>
                       </a:rPr>
-                      <m:t>0.98</m:t>
-                    </m:r>
-                    <m:r>
-                      <a:rPr lang="it-IT" b="0" i="1" smtClean="0">
-                        <a:latin typeface="Cambria Math" panose="02040503050406030204" pitchFamily="18" charset="0"/>
-                      </a:rPr>
-                      <m:t> </m:t>
+                      <m:t>0.98 </m:t>
                     </m:r>
                     <m:r>
                       <a:rPr lang="it-IT" i="1">
@@ -22526,7 +22512,7 @@
             </p:txBody>
           </p:sp>
         </mc:Choice>
-        <mc:Fallback>
+        <mc:Fallback xmlns="">
           <p:sp>
             <p:nvSpPr>
               <p:cNvPr id="14" name="CasellaDiTesto 13">
@@ -24454,8 +24440,8 @@
           </a:p>
         </p:txBody>
       </p:sp>
-      <mc:AlternateContent xmlns:mc="http://schemas.openxmlformats.org/markup-compatibility/2006">
-        <mc:Choice xmlns:a14="http://schemas.microsoft.com/office/drawing/2010/main" Requires="a14">
+      <mc:AlternateContent xmlns:mc="http://schemas.openxmlformats.org/markup-compatibility/2006" xmlns:a14="http://schemas.microsoft.com/office/drawing/2010/main">
+        <mc:Choice Requires="a14">
           <p:graphicFrame>
             <p:nvGraphicFramePr>
               <p:cNvPr id="9" name="Tabella 8">
@@ -25180,7 +25166,7 @@
             </a:graphic>
           </p:graphicFrame>
         </mc:Choice>
-        <mc:Fallback>
+        <mc:Fallback xmlns="">
           <p:graphicFrame>
             <p:nvGraphicFramePr>
               <p:cNvPr id="9" name="Tabella 8">
@@ -27253,7 +27239,7 @@
                 <a:latin typeface="Gill Sans Light"/>
                 <a:cs typeface="Gill Sans Light"/>
               </a:rPr>
-              <a:t>No steering among the inspected area</a:t>
+              <a:t>No steering in the inspected area</a:t>
             </a:r>
           </a:p>
           <a:p>

</xml_diff>